<commit_message>
Added Graphical minimization methods exercises and solutions
</commit_message>
<xml_diff>
--- a/06 - Graphical Minimization Methods/slides.pptx
+++ b/06 - Graphical Minimization Methods/slides.pptx
@@ -310,7 +310,7 @@
   <pc:docChgLst>
     <pc:chgData name="Riccardo Berta" userId="c8694f89-bba4-4576-b0a8-456619ca5a8c" providerId="ADAL" clId="{FDDBFC5A-5EA9-5330-BEB8-433D7E3B4C4E}"/>
     <pc:docChg chg="undo custSel addSld delSld modSld">
-      <pc:chgData name="Riccardo Berta" userId="c8694f89-bba4-4576-b0a8-456619ca5a8c" providerId="ADAL" clId="{FDDBFC5A-5EA9-5330-BEB8-433D7E3B4C4E}" dt="2025-10-30T21:53:10.455" v="2880" actId="1076"/>
+      <pc:chgData name="Riccardo Berta" userId="c8694f89-bba4-4576-b0a8-456619ca5a8c" providerId="ADAL" clId="{FDDBFC5A-5EA9-5330-BEB8-433D7E3B4C4E}" dt="2025-10-31T12:20:27.930" v="2890" actId="1076"/>
       <pc:docMkLst>
         <pc:docMk/>
       </pc:docMkLst>
@@ -431,7 +431,7 @@
         </pc:picChg>
       </pc:sldChg>
       <pc:sldChg chg="addSp delSp modSp mod">
-        <pc:chgData name="Riccardo Berta" userId="c8694f89-bba4-4576-b0a8-456619ca5a8c" providerId="ADAL" clId="{FDDBFC5A-5EA9-5330-BEB8-433D7E3B4C4E}" dt="2025-10-30T06:28:36.838" v="299" actId="1076"/>
+        <pc:chgData name="Riccardo Berta" userId="c8694f89-bba4-4576-b0a8-456619ca5a8c" providerId="ADAL" clId="{FDDBFC5A-5EA9-5330-BEB8-433D7E3B4C4E}" dt="2025-10-31T12:20:27.930" v="2890" actId="1076"/>
         <pc:sldMkLst>
           <pc:docMk/>
           <pc:sldMk cId="3473763361" sldId="298"/>
@@ -453,7 +453,15 @@
           </ac:spMkLst>
         </pc:spChg>
         <pc:picChg chg="add mod">
-          <ac:chgData name="Riccardo Berta" userId="c8694f89-bba4-4576-b0a8-456619ca5a8c" providerId="ADAL" clId="{FDDBFC5A-5EA9-5330-BEB8-433D7E3B4C4E}" dt="2025-10-30T06:28:36.838" v="299" actId="1076"/>
+          <ac:chgData name="Riccardo Berta" userId="c8694f89-bba4-4576-b0a8-456619ca5a8c" providerId="ADAL" clId="{FDDBFC5A-5EA9-5330-BEB8-433D7E3B4C4E}" dt="2025-10-31T12:20:05.898" v="2883" actId="1076"/>
+          <ac:picMkLst>
+            <pc:docMk/>
+            <pc:sldMk cId="3473763361" sldId="298"/>
+            <ac:picMk id="2" creationId="{FDD51FC5-76EC-13FB-CEF9-C1B2AA6227C9}"/>
+          </ac:picMkLst>
+        </pc:picChg>
+        <pc:picChg chg="add del mod">
+          <ac:chgData name="Riccardo Berta" userId="c8694f89-bba4-4576-b0a8-456619ca5a8c" providerId="ADAL" clId="{FDDBFC5A-5EA9-5330-BEB8-433D7E3B4C4E}" dt="2025-10-31T12:20:18.961" v="2887" actId="478"/>
           <ac:picMkLst>
             <pc:docMk/>
             <pc:sldMk cId="3473763361" sldId="298"/>
@@ -461,7 +469,15 @@
           </ac:picMkLst>
         </pc:picChg>
         <pc:picChg chg="add mod">
-          <ac:chgData name="Riccardo Berta" userId="c8694f89-bba4-4576-b0a8-456619ca5a8c" providerId="ADAL" clId="{FDDBFC5A-5EA9-5330-BEB8-433D7E3B4C4E}" dt="2025-10-30T06:28:29.148" v="297" actId="1076"/>
+          <ac:chgData name="Riccardo Berta" userId="c8694f89-bba4-4576-b0a8-456619ca5a8c" providerId="ADAL" clId="{FDDBFC5A-5EA9-5330-BEB8-433D7E3B4C4E}" dt="2025-10-31T12:20:27.930" v="2890" actId="1076"/>
+          <ac:picMkLst>
+            <pc:docMk/>
+            <pc:sldMk cId="3473763361" sldId="298"/>
+            <ac:picMk id="5" creationId="{9E3EEB58-1830-68DF-5EA8-A5A98169A447}"/>
+          </ac:picMkLst>
+        </pc:picChg>
+        <pc:picChg chg="add del mod">
+          <ac:chgData name="Riccardo Berta" userId="c8694f89-bba4-4576-b0a8-456619ca5a8c" providerId="ADAL" clId="{FDDBFC5A-5EA9-5330-BEB8-433D7E3B4C4E}" dt="2025-10-31T12:19:57.815" v="2881" actId="478"/>
           <ac:picMkLst>
             <pc:docMk/>
             <pc:sldMk cId="3473763361" sldId="298"/>
@@ -14507,10 +14523,10 @@
       </p:sp>
       <p:pic>
         <p:nvPicPr>
-          <p:cNvPr id="6" name="Immagine 5">
+          <p:cNvPr id="2" name="Immagine 1">
             <a:extLst>
               <a:ext uri="{FF2B5EF4-FFF2-40B4-BE49-F238E27FC236}">
-                <a16:creationId xmlns:a16="http://schemas.microsoft.com/office/drawing/2014/main" id="{B9D661B7-E881-C8B0-ACFD-F5C865494A94}"/>
+                <a16:creationId xmlns:a16="http://schemas.microsoft.com/office/drawing/2014/main" id="{FDD51FC5-76EC-13FB-CEF9-C1B2AA6227C9}"/>
               </a:ext>
             </a:extLst>
           </p:cNvPr>
@@ -14527,8 +14543,8 @@
         </p:blipFill>
         <p:spPr>
           <a:xfrm>
-            <a:off x="455098" y="1757527"/>
-            <a:ext cx="8233804" cy="4133369"/>
+            <a:off x="618423" y="1830836"/>
+            <a:ext cx="7772400" cy="3901744"/>
           </a:xfrm>
           <a:prstGeom prst="rect">
             <a:avLst/>
@@ -14537,10 +14553,10 @@
       </p:pic>
       <p:pic>
         <p:nvPicPr>
-          <p:cNvPr id="3" name="Immagine 2" descr="Immagine che contiene testo, Carattere, tipografia, calligrafia&#10;&#10;Il contenuto generato dall'IA potrebbe non essere corretto.">
+          <p:cNvPr id="5" name="Immagine 4" descr="Immagine che contiene Carattere, testo, bianco, tipografia&#10;&#10;Il contenuto generato dall'IA potrebbe non essere corretto.">
             <a:extLst>
               <a:ext uri="{FF2B5EF4-FFF2-40B4-BE49-F238E27FC236}">
-                <a16:creationId xmlns:a16="http://schemas.microsoft.com/office/drawing/2014/main" id="{4B5B1CAD-C135-2FEF-D938-3C072FE423B9}"/>
+                <a16:creationId xmlns:a16="http://schemas.microsoft.com/office/drawing/2014/main" id="{9E3EEB58-1830-68DF-5EA8-A5A98169A447}"/>
               </a:ext>
             </a:extLst>
           </p:cNvPr>
@@ -14557,8 +14573,8 @@
         </p:blipFill>
         <p:spPr>
           <a:xfrm>
-            <a:off x="943429" y="5732580"/>
-            <a:ext cx="4775200" cy="876300"/>
+            <a:off x="1108442" y="5695408"/>
+            <a:ext cx="4701945" cy="896650"/>
           </a:xfrm>
           <a:prstGeom prst="rect">
             <a:avLst/>
@@ -19278,6 +19294,26 @@
 </file>
 
 <file path=customXml/item1.xml><?xml version="1.0" encoding="utf-8"?>
+<?mso-contentType ?>
+<FormTemplates xmlns="http://schemas.microsoft.com/sharepoint/v3/contenttype/forms">
+  <Display>DocumentLibraryForm</Display>
+  <Edit>DocumentLibraryForm</Edit>
+  <New>DocumentLibraryForm</New>
+</FormTemplates>
+</file>
+
+<file path=customXml/item2.xml><?xml version="1.0" encoding="utf-8"?>
+<p:properties xmlns:p="http://schemas.microsoft.com/office/2006/metadata/properties" xmlns:xsi="http://www.w3.org/2001/XMLSchema-instance" xmlns:pc="http://schemas.microsoft.com/office/infopath/2007/PartnerControls">
+  <documentManagement>
+    <TaxCatchAll xmlns="e9b5433c-2372-4cb7-8bab-09518096b29b" xsi:nil="true"/>
+    <lcf76f155ced4ddcb4097134ff3c332f xmlns="3bd0d43f-5e5b-43cd-b6fc-691bd77672c6">
+      <Terms xmlns="http://schemas.microsoft.com/office/infopath/2007/PartnerControls"/>
+    </lcf76f155ced4ddcb4097134ff3c332f>
+  </documentManagement>
+</p:properties>
+</file>
+
+<file path=customXml/item3.xml><?xml version="1.0" encoding="utf-8"?>
 <ct:contentTypeSchema xmlns:ct="http://schemas.microsoft.com/office/2006/metadata/contentType" xmlns:ma="http://schemas.microsoft.com/office/2006/metadata/properties/metaAttributes" ct:_="" ma:_="" ma:contentTypeName="Documento" ma:contentTypeID="0x010100B8FA822B18A0634FB7342CF29752587A" ma:contentTypeVersion="12" ma:contentTypeDescription="Creare un nuovo documento." ma:contentTypeScope="" ma:versionID="4c8b1e8002f5a6c880c83187af115cef">
   <xsd:schema xmlns:xsd="http://www.w3.org/2001/XMLSchema" xmlns:xs="http://www.w3.org/2001/XMLSchema" xmlns:p="http://schemas.microsoft.com/office/2006/metadata/properties" xmlns:ns2="3bd0d43f-5e5b-43cd-b6fc-691bd77672c6" xmlns:ns3="e9b5433c-2372-4cb7-8bab-09518096b29b" targetNamespace="http://schemas.microsoft.com/office/2006/metadata/properties" ma:root="true" ma:fieldsID="618b708abf3b656f834d84e193700042" ns2:_="" ns3:_="">
     <xsd:import namespace="3bd0d43f-5e5b-43cd-b6fc-691bd77672c6"/>
@@ -19478,27 +19514,32 @@
 </ct:contentTypeSchema>
 </file>
 
-<file path=customXml/item2.xml><?xml version="1.0" encoding="utf-8"?>
-<?mso-contentType ?>
-<FormTemplates xmlns="http://schemas.microsoft.com/sharepoint/v3/contenttype/forms">
-  <Display>DocumentLibraryForm</Display>
-  <Edit>DocumentLibraryForm</Edit>
-  <New>DocumentLibraryForm</New>
-</FormTemplates>
+<file path=customXml/itemProps1.xml><?xml version="1.0" encoding="utf-8"?>
+<ds:datastoreItem xmlns:ds="http://schemas.openxmlformats.org/officeDocument/2006/customXml" ds:itemID="{0814236D-9FAD-4894-8A09-B648BE89B529}">
+  <ds:schemaRefs>
+    <ds:schemaRef ds:uri="http://schemas.microsoft.com/sharepoint/v3/contenttype/forms"/>
+  </ds:schemaRefs>
+</ds:datastoreItem>
 </file>
 
-<file path=customXml/item3.xml><?xml version="1.0" encoding="utf-8"?>
-<p:properties xmlns:p="http://schemas.microsoft.com/office/2006/metadata/properties" xmlns:xsi="http://www.w3.org/2001/XMLSchema-instance" xmlns:pc="http://schemas.microsoft.com/office/infopath/2007/PartnerControls">
-  <documentManagement>
-    <TaxCatchAll xmlns="e9b5433c-2372-4cb7-8bab-09518096b29b" xsi:nil="true"/>
-    <lcf76f155ced4ddcb4097134ff3c332f xmlns="3bd0d43f-5e5b-43cd-b6fc-691bd77672c6">
-      <Terms xmlns="http://schemas.microsoft.com/office/infopath/2007/PartnerControls"/>
-    </lcf76f155ced4ddcb4097134ff3c332f>
-  </documentManagement>
-</p:properties>
+<file path=customXml/itemProps2.xml><?xml version="1.0" encoding="utf-8"?>
+<ds:datastoreItem xmlns:ds="http://schemas.openxmlformats.org/officeDocument/2006/customXml" ds:itemID="{C9A1392A-F9C5-4A0D-8864-DAD0DEA08779}">
+  <ds:schemaRefs>
+    <ds:schemaRef ds:uri="http://purl.org/dc/elements/1.1/"/>
+    <ds:schemaRef ds:uri="3bd0d43f-5e5b-43cd-b6fc-691bd77672c6"/>
+    <ds:schemaRef ds:uri="http://schemas.microsoft.com/office/2006/metadata/properties"/>
+    <ds:schemaRef ds:uri="http://schemas.microsoft.com/office/2006/documentManagement/types"/>
+    <ds:schemaRef ds:uri="http://schemas.openxmlformats.org/package/2006/metadata/core-properties"/>
+    <ds:schemaRef ds:uri="http://purl.org/dc/dcmitype/"/>
+    <ds:schemaRef ds:uri="http://www.w3.org/XML/1998/namespace"/>
+    <ds:schemaRef ds:uri="http://schemas.microsoft.com/office/infopath/2007/PartnerControls"/>
+    <ds:schemaRef ds:uri="e9b5433c-2372-4cb7-8bab-09518096b29b"/>
+    <ds:schemaRef ds:uri="http://purl.org/dc/terms/"/>
+  </ds:schemaRefs>
+</ds:datastoreItem>
 </file>
 
-<file path=customXml/itemProps1.xml><?xml version="1.0" encoding="utf-8"?>
+<file path=customXml/itemProps3.xml><?xml version="1.0" encoding="utf-8"?>
 <ds:datastoreItem xmlns:ds="http://schemas.openxmlformats.org/officeDocument/2006/customXml" ds:itemID="{107104EA-B74B-4E24-959A-7FA2D7B16B64}">
   <ds:schemaRefs>
     <ds:schemaRef ds:uri="http://schemas.microsoft.com/office/2006/metadata/contentType"/>
@@ -19515,29 +19556,4 @@
     <ds:schemaRef ds:uri="http://schemas.microsoft.com/internal/obd"/>
   </ds:schemaRefs>
 </ds:datastoreItem>
-</file>
-
-<file path=customXml/itemProps2.xml><?xml version="1.0" encoding="utf-8"?>
-<ds:datastoreItem xmlns:ds="http://schemas.openxmlformats.org/officeDocument/2006/customXml" ds:itemID="{0814236D-9FAD-4894-8A09-B648BE89B529}">
-  <ds:schemaRefs>
-    <ds:schemaRef ds:uri="http://schemas.microsoft.com/sharepoint/v3/contenttype/forms"/>
-  </ds:schemaRefs>
-</ds:datastoreItem>
-</file>
-
-<file path=customXml/itemProps3.xml><?xml version="1.0" encoding="utf-8"?>
-<ds:datastoreItem xmlns:ds="http://schemas.openxmlformats.org/officeDocument/2006/customXml" ds:itemID="{C9A1392A-F9C5-4A0D-8864-DAD0DEA08779}">
-  <ds:schemaRefs>
-    <ds:schemaRef ds:uri="http://purl.org/dc/dcmitype/"/>
-    <ds:schemaRef ds:uri="e9b5433c-2372-4cb7-8bab-09518096b29b"/>
-    <ds:schemaRef ds:uri="http://schemas.microsoft.com/office/2006/documentManagement/types"/>
-    <ds:schemaRef ds:uri="http://schemas.microsoft.com/office/infopath/2007/PartnerControls"/>
-    <ds:schemaRef ds:uri="http://www.w3.org/XML/1998/namespace"/>
-    <ds:schemaRef ds:uri="http://purl.org/dc/elements/1.1/"/>
-    <ds:schemaRef ds:uri="http://purl.org/dc/terms/"/>
-    <ds:schemaRef ds:uri="http://schemas.openxmlformats.org/package/2006/metadata/core-properties"/>
-    <ds:schemaRef ds:uri="3bd0d43f-5e5b-43cd-b6fc-691bd77672c6"/>
-    <ds:schemaRef ds:uri="http://schemas.microsoft.com/office/2006/metadata/properties"/>
-  </ds:schemaRefs>
-</ds:datastoreItem>
 </file>
</xml_diff>